<commit_message>
Work on the simplest demo. Writing Feasable().
</commit_message>
<xml_diff>
--- a/MiddleMeetings/191227/191227.pptx
+++ b/MiddleMeetings/191227/191227.pptx
@@ -5,13 +5,15 @@
     <p:sldMasterId id="2147483744" r:id="rId1"/>
   </p:sldMasterIdLst>
   <p:notesMasterIdLst>
-    <p:notesMasterId r:id="rId6"/>
+    <p:notesMasterId r:id="rId8"/>
   </p:notesMasterIdLst>
   <p:sldIdLst>
     <p:sldId id="256" r:id="rId2"/>
     <p:sldId id="257" r:id="rId3"/>
     <p:sldId id="258" r:id="rId4"/>
     <p:sldId id="259" r:id="rId5"/>
+    <p:sldId id="261" r:id="rId6"/>
+    <p:sldId id="260" r:id="rId7"/>
   </p:sldIdLst>
   <p:sldSz cx="12192000" cy="6858000"/>
   <p:notesSz cx="6858000" cy="9144000"/>
@@ -6305,7 +6307,7 @@
           <a:p>
             <a:r>
               <a:rPr lang="en-US" dirty="0"/>
-              <a:t>Examples in the papers</a:t>
+              <a:t>Examples in the papers </a:t>
             </a:r>
           </a:p>
         </p:txBody>
@@ -6653,7 +6655,7 @@
         </p:blipFill>
         <p:spPr>
           <a:xfrm>
-            <a:off x="1105988" y="4809308"/>
+            <a:off x="2299062" y="4800601"/>
             <a:ext cx="7593873" cy="1497874"/>
           </a:xfrm>
           <a:prstGeom prst="rect">
@@ -6718,7 +6720,7 @@
             </a:pPr>
             <a:r>
               <a:rPr lang="en-US" dirty="0"/>
-              <a:t>20 or 21 degrees of freedom, the space is grand </a:t>
+              <a:t>20 or 21 degrees of freedom, the space is grand, and most of them is blank </a:t>
             </a:r>
           </a:p>
           <a:p>
@@ -6749,6 +6751,17 @@
             <a:r>
               <a:rPr lang="en-US" dirty="0"/>
               <a:t>Low resolution global navigation layer, traditional path finding techniques </a:t>
+            </a:r>
+            <a:endParaRPr lang="en-US" altLang="zh-CN" dirty="0"/>
+          </a:p>
+          <a:p>
+            <a:pPr marL="742950" lvl="1" indent="-285750">
+              <a:buFont typeface="Arial" panose="020B0604020202020204" pitchFamily="34" charset="0"/>
+              <a:buChar char="•"/>
+            </a:pPr>
+            <a:r>
+              <a:rPr lang="en-US" dirty="0"/>
+              <a:t>Use a specific modulus to take account of energy and time consumed </a:t>
             </a:r>
           </a:p>
         </p:txBody>
@@ -6775,30 +6788,341 @@
         </p:blipFill>
         <p:spPr>
           <a:xfrm>
-            <a:off x="7086557" y="2753894"/>
+            <a:off x="7156225" y="2971736"/>
             <a:ext cx="4515480" cy="914528"/>
           </a:xfrm>
           <a:prstGeom prst="rect">
             <a:avLst/>
           </a:prstGeom>
-          <a:ln w="88900" cap="sq" cmpd="thickThin">
-            <a:solidFill>
-              <a:srgbClr val="000000"/>
-            </a:solidFill>
-            <a:prstDash val="solid"/>
-            <a:miter lim="800000"/>
+          <a:ln>
+            <a:noFill/>
           </a:ln>
           <a:effectLst>
-            <a:innerShdw blurRad="76200">
-              <a:srgbClr val="000000"/>
-            </a:innerShdw>
+            <a:reflection blurRad="12700" stA="30000" endPos="30000" dist="5000" dir="5400000" sy="-100000" algn="bl" rotWithShape="0"/>
           </a:effectLst>
+          <a:scene3d>
+            <a:camera prst="perspectiveContrastingLeftFacing">
+              <a:rot lat="300000" lon="19800000" rev="0"/>
+            </a:camera>
+            <a:lightRig rig="threePt" dir="t">
+              <a:rot lat="0" lon="0" rev="2700000"/>
+            </a:lightRig>
+          </a:scene3d>
+          <a:sp3d>
+            <a:bevelT w="63500" h="50800"/>
+          </a:sp3d>
         </p:spPr>
       </p:pic>
     </p:spTree>
     <p:extLst>
       <p:ext uri="{BB962C8B-B14F-4D97-AF65-F5344CB8AC3E}">
         <p14:creationId xmlns:p14="http://schemas.microsoft.com/office/powerpoint/2010/main" val="3237455677"/>
+      </p:ext>
+    </p:extLst>
+  </p:cSld>
+  <p:clrMapOvr>
+    <a:masterClrMapping/>
+  </p:clrMapOvr>
+</p:sld>
+</file>
+
+<file path=ppt/slides/slide5.xml><?xml version="1.0" encoding="utf-8"?>
+<p:sld xmlns:a="http://schemas.openxmlformats.org/drawingml/2006/main" xmlns:r="http://schemas.openxmlformats.org/officeDocument/2006/relationships" xmlns:p="http://schemas.openxmlformats.org/presentationml/2006/main">
+  <p:cSld>
+    <p:spTree>
+      <p:nvGrpSpPr>
+        <p:cNvPr id="1" name=""/>
+        <p:cNvGrpSpPr/>
+        <p:nvPr/>
+      </p:nvGrpSpPr>
+      <p:grpSpPr>
+        <a:xfrm>
+          <a:off x="0" y="0"/>
+          <a:ext cx="0" cy="0"/>
+          <a:chOff x="0" y="0"/>
+          <a:chExt cx="0" cy="0"/>
+        </a:xfrm>
+      </p:grpSpPr>
+      <p:sp>
+        <p:nvSpPr>
+          <p:cNvPr id="2" name="Title 1">
+            <a:extLst>
+              <a:ext uri="{FF2B5EF4-FFF2-40B4-BE49-F238E27FC236}">
+                <a16:creationId xmlns:a16="http://schemas.microsoft.com/office/drawing/2014/main" id="{E3082290-851B-409B-B573-6BA70A5C42E4}"/>
+              </a:ext>
+            </a:extLst>
+          </p:cNvPr>
+          <p:cNvSpPr>
+            <a:spLocks noGrp="1"/>
+          </p:cNvSpPr>
+          <p:nvPr>
+            <p:ph type="title"/>
+          </p:nvPr>
+        </p:nvSpPr>
+        <p:spPr/>
+        <p:txBody>
+          <a:bodyPr/>
+          <a:lstStyle/>
+          <a:p>
+            <a:r>
+              <a:rPr lang="en-US" dirty="0"/>
+              <a:t>Global design</a:t>
+            </a:r>
+          </a:p>
+        </p:txBody>
+      </p:sp>
+      <p:sp>
+        <p:nvSpPr>
+          <p:cNvPr id="4" name="Text Placeholder 3">
+            <a:extLst>
+              <a:ext uri="{FF2B5EF4-FFF2-40B4-BE49-F238E27FC236}">
+                <a16:creationId xmlns:a16="http://schemas.microsoft.com/office/drawing/2014/main" id="{7673481E-BF79-48C0-95A7-CF7E7420E04F}"/>
+              </a:ext>
+            </a:extLst>
+          </p:cNvPr>
+          <p:cNvSpPr>
+            <a:spLocks noGrp="1"/>
+          </p:cNvSpPr>
+          <p:nvPr>
+            <p:ph type="body" sz="half" idx="2"/>
+          </p:nvPr>
+        </p:nvSpPr>
+        <p:spPr/>
+        <p:txBody>
+          <a:bodyPr/>
+          <a:lstStyle/>
+          <a:p>
+            <a:endParaRPr lang="en-US" dirty="0"/>
+          </a:p>
+        </p:txBody>
+      </p:sp>
+      <p:pic>
+        <p:nvPicPr>
+          <p:cNvPr id="8" name="Content Placeholder 7">
+            <a:extLst>
+              <a:ext uri="{FF2B5EF4-FFF2-40B4-BE49-F238E27FC236}">
+                <a16:creationId xmlns:a16="http://schemas.microsoft.com/office/drawing/2014/main" id="{0BFC15D6-E1F2-40B1-82E0-6EE2F862110A}"/>
+              </a:ext>
+            </a:extLst>
+          </p:cNvPr>
+          <p:cNvPicPr>
+            <a:picLocks noGrp="1" noChangeAspect="1"/>
+          </p:cNvPicPr>
+          <p:nvPr>
+            <p:ph idx="1"/>
+          </p:nvPr>
+        </p:nvPicPr>
+        <p:blipFill>
+          <a:blip r:embed="rId2"/>
+          <a:stretch>
+            <a:fillRect/>
+          </a:stretch>
+        </p:blipFill>
+        <p:spPr>
+          <a:xfrm>
+            <a:off x="4643750" y="1866357"/>
+            <a:ext cx="7370669" cy="3916133"/>
+          </a:xfrm>
+          <a:prstGeom prst="rect">
+            <a:avLst/>
+          </a:prstGeom>
+        </p:spPr>
+      </p:pic>
+    </p:spTree>
+    <p:extLst>
+      <p:ext uri="{BB962C8B-B14F-4D97-AF65-F5344CB8AC3E}">
+        <p14:creationId xmlns:p14="http://schemas.microsoft.com/office/powerpoint/2010/main" val="2264695635"/>
+      </p:ext>
+    </p:extLst>
+  </p:cSld>
+  <p:clrMapOvr>
+    <a:masterClrMapping/>
+  </p:clrMapOvr>
+</p:sld>
+</file>
+
+<file path=ppt/slides/slide6.xml><?xml version="1.0" encoding="utf-8"?>
+<p:sld xmlns:a="http://schemas.openxmlformats.org/drawingml/2006/main" xmlns:r="http://schemas.openxmlformats.org/officeDocument/2006/relationships" xmlns:p="http://schemas.openxmlformats.org/presentationml/2006/main">
+  <p:cSld>
+    <p:spTree>
+      <p:nvGrpSpPr>
+        <p:cNvPr id="1" name=""/>
+        <p:cNvGrpSpPr/>
+        <p:nvPr/>
+      </p:nvGrpSpPr>
+      <p:grpSpPr>
+        <a:xfrm>
+          <a:off x="0" y="0"/>
+          <a:ext cx="0" cy="0"/>
+          <a:chOff x="0" y="0"/>
+          <a:chExt cx="0" cy="0"/>
+        </a:xfrm>
+      </p:grpSpPr>
+      <p:sp>
+        <p:nvSpPr>
+          <p:cNvPr id="2" name="Title 1">
+            <a:extLst>
+              <a:ext uri="{FF2B5EF4-FFF2-40B4-BE49-F238E27FC236}">
+                <a16:creationId xmlns:a16="http://schemas.microsoft.com/office/drawing/2014/main" id="{4C415F85-037F-4C39-9658-EF94028FB553}"/>
+              </a:ext>
+            </a:extLst>
+          </p:cNvPr>
+          <p:cNvSpPr>
+            <a:spLocks noGrp="1"/>
+          </p:cNvSpPr>
+          <p:nvPr>
+            <p:ph type="title"/>
+          </p:nvPr>
+        </p:nvSpPr>
+        <p:spPr>
+          <a:xfrm>
+            <a:off x="565543" y="781316"/>
+            <a:ext cx="10131427" cy="566738"/>
+          </a:xfrm>
+        </p:spPr>
+        <p:txBody>
+          <a:bodyPr/>
+          <a:lstStyle/>
+          <a:p>
+            <a:r>
+              <a:rPr lang="en-US" dirty="0"/>
+              <a:t>Workspace preparation </a:t>
+            </a:r>
+          </a:p>
+        </p:txBody>
+      </p:sp>
+      <p:pic>
+        <p:nvPicPr>
+          <p:cNvPr id="5" name="Picture Placeholder 4">
+            <a:extLst>
+              <a:ext uri="{FF2B5EF4-FFF2-40B4-BE49-F238E27FC236}">
+                <a16:creationId xmlns:a16="http://schemas.microsoft.com/office/drawing/2014/main" id="{0721FCEC-4A0D-404C-BCF2-3996E8F64450}"/>
+              </a:ext>
+            </a:extLst>
+          </p:cNvPr>
+          <p:cNvPicPr>
+            <a:picLocks noGrp="1" noChangeAspect="1"/>
+          </p:cNvPicPr>
+          <p:nvPr>
+            <p:ph type="pic" idx="1"/>
+          </p:nvPr>
+        </p:nvPicPr>
+        <p:blipFill rotWithShape="1">
+          <a:blip r:embed="rId2"/>
+          <a:srcRect l="56" r="112"/>
+          <a:stretch/>
+        </p:blipFill>
+        <p:spPr>
+          <a:xfrm>
+            <a:off x="1654572" y="4644130"/>
+            <a:ext cx="8882856" cy="1565082"/>
+          </a:xfrm>
+          <a:prstGeom prst="rect">
+            <a:avLst/>
+          </a:prstGeom>
+        </p:spPr>
+      </p:pic>
+      <p:sp>
+        <p:nvSpPr>
+          <p:cNvPr id="4" name="Text Placeholder 3">
+            <a:extLst>
+              <a:ext uri="{FF2B5EF4-FFF2-40B4-BE49-F238E27FC236}">
+                <a16:creationId xmlns:a16="http://schemas.microsoft.com/office/drawing/2014/main" id="{FFFB548C-204A-455E-A53B-7601F11403D2}"/>
+              </a:ext>
+            </a:extLst>
+          </p:cNvPr>
+          <p:cNvSpPr>
+            <a:spLocks noGrp="1"/>
+          </p:cNvSpPr>
+          <p:nvPr>
+            <p:ph type="body" sz="half" idx="2"/>
+          </p:nvPr>
+        </p:nvSpPr>
+        <p:spPr>
+          <a:xfrm>
+            <a:off x="565543" y="2031216"/>
+            <a:ext cx="10131427" cy="2296944"/>
+          </a:xfrm>
+        </p:spPr>
+        <p:txBody>
+          <a:bodyPr/>
+          <a:lstStyle/>
+          <a:p>
+            <a:pPr marL="285750" indent="-285750">
+              <a:buFont typeface="Arial" panose="020B0604020202020204" pitchFamily="34" charset="0"/>
+              <a:buChar char="•"/>
+            </a:pPr>
+            <a:r>
+              <a:rPr lang="en-US" dirty="0"/>
+              <a:t>Installed Tensorflow (but might not be useful) </a:t>
+            </a:r>
+          </a:p>
+          <a:p>
+            <a:pPr marL="285750" indent="-285750">
+              <a:buFont typeface="Arial" panose="020B0604020202020204" pitchFamily="34" charset="0"/>
+              <a:buChar char="•"/>
+            </a:pPr>
+            <a:r>
+              <a:rPr lang="en-US" dirty="0"/>
+              <a:t>Initiated Git repository (for tracking work and working on different computers)</a:t>
+            </a:r>
+          </a:p>
+          <a:p>
+            <a:endParaRPr lang="en-US" dirty="0"/>
+          </a:p>
+        </p:txBody>
+      </p:sp>
+      <p:pic>
+        <p:nvPicPr>
+          <p:cNvPr id="7" name="Picture 6">
+            <a:extLst>
+              <a:ext uri="{FF2B5EF4-FFF2-40B4-BE49-F238E27FC236}">
+                <a16:creationId xmlns:a16="http://schemas.microsoft.com/office/drawing/2014/main" id="{B2425DE6-BF45-43E8-AA4F-1BB5595D634C}"/>
+              </a:ext>
+            </a:extLst>
+          </p:cNvPr>
+          <p:cNvPicPr>
+            <a:picLocks noChangeAspect="1"/>
+          </p:cNvPicPr>
+          <p:nvPr/>
+        </p:nvPicPr>
+        <p:blipFill>
+          <a:blip r:embed="rId3"/>
+          <a:stretch>
+            <a:fillRect/>
+          </a:stretch>
+        </p:blipFill>
+        <p:spPr>
+          <a:xfrm>
+            <a:off x="7883988" y="1495861"/>
+            <a:ext cx="3419647" cy="2377333"/>
+          </a:xfrm>
+          <a:prstGeom prst="rect">
+            <a:avLst/>
+          </a:prstGeom>
+          <a:ln>
+            <a:noFill/>
+          </a:ln>
+          <a:effectLst>
+            <a:reflection blurRad="12700" stA="30000" endPos="30000" dist="5000" dir="5400000" sy="-100000" algn="bl" rotWithShape="0"/>
+          </a:effectLst>
+          <a:scene3d>
+            <a:camera prst="perspectiveContrastingLeftFacing">
+              <a:rot lat="300000" lon="19800000" rev="0"/>
+            </a:camera>
+            <a:lightRig rig="threePt" dir="t">
+              <a:rot lat="0" lon="0" rev="2700000"/>
+            </a:lightRig>
+          </a:scene3d>
+          <a:sp3d>
+            <a:bevelT w="63500" h="50800"/>
+          </a:sp3d>
+        </p:spPr>
+      </p:pic>
+    </p:spTree>
+    <p:extLst>
+      <p:ext uri="{BB962C8B-B14F-4D97-AF65-F5344CB8AC3E}">
+        <p14:creationId xmlns:p14="http://schemas.microsoft.com/office/powerpoint/2010/main" val="2086827098"/>
       </p:ext>
     </p:extLst>
   </p:cSld>

</xml_diff>